<commit_message>
sign-in, log-in. emotion method etc..
sign-in, log-in. emotion method etc..
</commit_message>
<xml_diff>
--- a/doc/JAM LAND_웹서프final예비.pptx
+++ b/doc/JAM LAND_웹서프final예비.pptx
@@ -202,7 +202,7 @@
           <a:p>
             <a:fld id="{7D9C3A5C-62FC-4E22-B27D-2A6BFB67F9F6}" type="datetimeFigureOut">
               <a:rPr lang="ko-KR" altLang="en-US" smtClean="0"/>
-              <a:t>2016-06-05</a:t>
+              <a:t>2016-06-06</a:t>
             </a:fld>
             <a:endParaRPr lang="ko-KR" altLang="en-US"/>
           </a:p>
@@ -743,7 +743,7 @@
           <a:p>
             <a:fld id="{6182C935-0E14-4891-8B35-9AA240A71E44}" type="datetimeFigureOut">
               <a:rPr lang="ko-KR" altLang="en-US" smtClean="0"/>
-              <a:t>2016-06-05</a:t>
+              <a:t>2016-06-06</a:t>
             </a:fld>
             <a:endParaRPr lang="ko-KR" altLang="en-US"/>
           </a:p>
@@ -913,7 +913,7 @@
           <a:p>
             <a:fld id="{6182C935-0E14-4891-8B35-9AA240A71E44}" type="datetimeFigureOut">
               <a:rPr lang="ko-KR" altLang="en-US" smtClean="0"/>
-              <a:t>2016-06-05</a:t>
+              <a:t>2016-06-06</a:t>
             </a:fld>
             <a:endParaRPr lang="ko-KR" altLang="en-US"/>
           </a:p>
@@ -1093,7 +1093,7 @@
           <a:p>
             <a:fld id="{6182C935-0E14-4891-8B35-9AA240A71E44}" type="datetimeFigureOut">
               <a:rPr lang="ko-KR" altLang="en-US" smtClean="0"/>
-              <a:t>2016-06-05</a:t>
+              <a:t>2016-06-06</a:t>
             </a:fld>
             <a:endParaRPr lang="ko-KR" altLang="en-US"/>
           </a:p>
@@ -1263,7 +1263,7 @@
           <a:p>
             <a:fld id="{6182C935-0E14-4891-8B35-9AA240A71E44}" type="datetimeFigureOut">
               <a:rPr lang="ko-KR" altLang="en-US" smtClean="0"/>
-              <a:t>2016-06-05</a:t>
+              <a:t>2016-06-06</a:t>
             </a:fld>
             <a:endParaRPr lang="ko-KR" altLang="en-US"/>
           </a:p>
@@ -1509,7 +1509,7 @@
           <a:p>
             <a:fld id="{6182C935-0E14-4891-8B35-9AA240A71E44}" type="datetimeFigureOut">
               <a:rPr lang="ko-KR" altLang="en-US" smtClean="0"/>
-              <a:t>2016-06-05</a:t>
+              <a:t>2016-06-06</a:t>
             </a:fld>
             <a:endParaRPr lang="ko-KR" altLang="en-US"/>
           </a:p>
@@ -1797,7 +1797,7 @@
           <a:p>
             <a:fld id="{6182C935-0E14-4891-8B35-9AA240A71E44}" type="datetimeFigureOut">
               <a:rPr lang="ko-KR" altLang="en-US" smtClean="0"/>
-              <a:t>2016-06-05</a:t>
+              <a:t>2016-06-06</a:t>
             </a:fld>
             <a:endParaRPr lang="ko-KR" altLang="en-US"/>
           </a:p>
@@ -2219,7 +2219,7 @@
           <a:p>
             <a:fld id="{6182C935-0E14-4891-8B35-9AA240A71E44}" type="datetimeFigureOut">
               <a:rPr lang="ko-KR" altLang="en-US" smtClean="0"/>
-              <a:t>2016-06-05</a:t>
+              <a:t>2016-06-06</a:t>
             </a:fld>
             <a:endParaRPr lang="ko-KR" altLang="en-US"/>
           </a:p>
@@ -2337,7 +2337,7 @@
           <a:p>
             <a:fld id="{6182C935-0E14-4891-8B35-9AA240A71E44}" type="datetimeFigureOut">
               <a:rPr lang="ko-KR" altLang="en-US" smtClean="0"/>
-              <a:t>2016-06-05</a:t>
+              <a:t>2016-06-06</a:t>
             </a:fld>
             <a:endParaRPr lang="ko-KR" altLang="en-US"/>
           </a:p>
@@ -2432,7 +2432,7 @@
           <a:p>
             <a:fld id="{6182C935-0E14-4891-8B35-9AA240A71E44}" type="datetimeFigureOut">
               <a:rPr lang="ko-KR" altLang="en-US" smtClean="0"/>
-              <a:t>2016-06-05</a:t>
+              <a:t>2016-06-06</a:t>
             </a:fld>
             <a:endParaRPr lang="ko-KR" altLang="en-US"/>
           </a:p>
@@ -2709,7 +2709,7 @@
           <a:p>
             <a:fld id="{6182C935-0E14-4891-8B35-9AA240A71E44}" type="datetimeFigureOut">
               <a:rPr lang="ko-KR" altLang="en-US" smtClean="0"/>
-              <a:t>2016-06-05</a:t>
+              <a:t>2016-06-06</a:t>
             </a:fld>
             <a:endParaRPr lang="ko-KR" altLang="en-US"/>
           </a:p>
@@ -2962,7 +2962,7 @@
           <a:p>
             <a:fld id="{6182C935-0E14-4891-8B35-9AA240A71E44}" type="datetimeFigureOut">
               <a:rPr lang="ko-KR" altLang="en-US" smtClean="0"/>
-              <a:t>2016-06-05</a:t>
+              <a:t>2016-06-06</a:t>
             </a:fld>
             <a:endParaRPr lang="ko-KR" altLang="en-US"/>
           </a:p>
@@ -3175,7 +3175,7 @@
           <a:p>
             <a:fld id="{6182C935-0E14-4891-8B35-9AA240A71E44}" type="datetimeFigureOut">
               <a:rPr lang="ko-KR" altLang="en-US" smtClean="0"/>
-              <a:t>2016-06-05</a:t>
+              <a:t>2016-06-06</a:t>
             </a:fld>
             <a:endParaRPr lang="ko-KR" altLang="en-US"/>
           </a:p>
@@ -6560,6 +6560,9 @@
           <a:prstGeom prst="ellipse">
             <a:avLst/>
           </a:prstGeom>
+          <a:solidFill>
+            <a:srgbClr val="1482FC"/>
+          </a:solidFill>
           <a:ln w="19050"/>
         </p:spPr>
         <p:style>
@@ -6582,29 +6585,53 @@
           <a:p>
             <a:pPr algn="ctr"/>
             <a:r>
-              <a:rPr lang="en-US" altLang="ko-KR" sz="1200" dirty="0" err="1" smtClean="0"/>
+              <a:rPr lang="en-US" altLang="ko-KR" sz="1200" b="1" dirty="0" err="1" smtClean="0">
+                <a:solidFill>
+                  <a:schemeClr val="bg1"/>
+                </a:solidFill>
+              </a:rPr>
               <a:t>Youtube</a:t>
             </a:r>
             <a:r>
-              <a:rPr lang="en-US" altLang="ko-KR" sz="1200" dirty="0" smtClean="0"/>
+              <a:rPr lang="en-US" altLang="ko-KR" sz="1200" b="1" dirty="0" smtClean="0">
+                <a:solidFill>
+                  <a:schemeClr val="bg1"/>
+                </a:solidFill>
+              </a:rPr>
               <a:t> </a:t>
             </a:r>
           </a:p>
           <a:p>
             <a:pPr algn="ctr"/>
             <a:r>
-              <a:rPr lang="ko-KR" altLang="en-US" sz="1200" dirty="0" smtClean="0"/>
+              <a:rPr lang="ko-KR" altLang="en-US" sz="1200" b="1" dirty="0" smtClean="0">
+                <a:solidFill>
+                  <a:schemeClr val="bg1"/>
+                </a:solidFill>
+              </a:rPr>
               <a:t>동영상 </a:t>
             </a:r>
-            <a:endParaRPr lang="en-US" altLang="ko-KR" sz="1200" dirty="0" smtClean="0"/>
+            <a:endParaRPr lang="en-US" altLang="ko-KR" sz="1200" b="1" dirty="0" smtClean="0">
+              <a:solidFill>
+                <a:schemeClr val="bg1"/>
+              </a:solidFill>
+            </a:endParaRPr>
           </a:p>
           <a:p>
             <a:pPr algn="ctr"/>
             <a:r>
-              <a:rPr lang="ko-KR" altLang="en-US" sz="1200" dirty="0" smtClean="0"/>
+              <a:rPr lang="ko-KR" altLang="en-US" sz="1200" b="1" dirty="0" smtClean="0">
+                <a:solidFill>
+                  <a:schemeClr val="bg1"/>
+                </a:solidFill>
+              </a:rPr>
               <a:t>보기</a:t>
             </a:r>
-            <a:endParaRPr lang="ko-KR" altLang="en-US" sz="1200" dirty="0"/>
+            <a:endParaRPr lang="ko-KR" altLang="en-US" sz="1200" b="1" dirty="0">
+              <a:solidFill>
+                <a:schemeClr val="bg1"/>
+              </a:solidFill>
+            </a:endParaRPr>
           </a:p>
         </p:txBody>
       </p:sp>
@@ -6622,6 +6649,9 @@
           <a:prstGeom prst="ellipse">
             <a:avLst/>
           </a:prstGeom>
+          <a:solidFill>
+            <a:srgbClr val="1482FC"/>
+          </a:solidFill>
           <a:ln w="19050"/>
         </p:spPr>
         <p:style>
@@ -6644,18 +6674,34 @@
           <a:p>
             <a:pPr algn="ctr"/>
             <a:r>
-              <a:rPr lang="ko-KR" altLang="en-US" sz="1200" dirty="0" smtClean="0"/>
+              <a:rPr lang="ko-KR" altLang="en-US" sz="1200" b="1" dirty="0" smtClean="0">
+                <a:solidFill>
+                  <a:schemeClr val="bg1"/>
+                </a:solidFill>
+              </a:rPr>
               <a:t>글 </a:t>
             </a:r>
-            <a:endParaRPr lang="en-US" altLang="ko-KR" sz="1200" dirty="0" smtClean="0"/>
+            <a:endParaRPr lang="en-US" altLang="ko-KR" sz="1200" b="1" dirty="0" smtClean="0">
+              <a:solidFill>
+                <a:schemeClr val="bg1"/>
+              </a:solidFill>
+            </a:endParaRPr>
           </a:p>
           <a:p>
             <a:pPr algn="ctr"/>
             <a:r>
-              <a:rPr lang="ko-KR" altLang="en-US" sz="1200" dirty="0" smtClean="0"/>
+              <a:rPr lang="ko-KR" altLang="en-US" sz="1200" b="1" dirty="0" smtClean="0">
+                <a:solidFill>
+                  <a:schemeClr val="bg1"/>
+                </a:solidFill>
+              </a:rPr>
               <a:t>목록보기</a:t>
             </a:r>
-            <a:endParaRPr lang="ko-KR" altLang="en-US" sz="1200" dirty="0"/>
+            <a:endParaRPr lang="ko-KR" altLang="en-US" sz="1200" b="1" dirty="0">
+              <a:solidFill>
+                <a:schemeClr val="bg1"/>
+              </a:solidFill>
+            </a:endParaRPr>
           </a:p>
         </p:txBody>
       </p:sp>

</xml_diff>